<commit_message>
add beam direction arrow
</commit_message>
<xml_diff>
--- a/fig/PhotekPaper/Paper2Fig2.pptx
+++ b/fig/PhotekPaper/Paper2Fig2.pptx
@@ -288,7 +288,7 @@
           <a:p>
             <a:fld id="{813840A2-6C65-8C47-9EA8-55A3FD83A1AA}" type="datetimeFigureOut">
               <a:rPr lang="en-US" smtClean="0"/>
-              <a:t>4/28/15</a:t>
+              <a:t>4/29/15</a:t>
             </a:fld>
             <a:endParaRPr lang="en-US"/>
           </a:p>
@@ -458,7 +458,7 @@
           <a:p>
             <a:fld id="{813840A2-6C65-8C47-9EA8-55A3FD83A1AA}" type="datetimeFigureOut">
               <a:rPr lang="en-US" smtClean="0"/>
-              <a:t>4/28/15</a:t>
+              <a:t>4/29/15</a:t>
             </a:fld>
             <a:endParaRPr lang="en-US"/>
           </a:p>
@@ -638,7 +638,7 @@
           <a:p>
             <a:fld id="{813840A2-6C65-8C47-9EA8-55A3FD83A1AA}" type="datetimeFigureOut">
               <a:rPr lang="en-US" smtClean="0"/>
-              <a:t>4/28/15</a:t>
+              <a:t>4/29/15</a:t>
             </a:fld>
             <a:endParaRPr lang="en-US"/>
           </a:p>
@@ -808,7 +808,7 @@
           <a:p>
             <a:fld id="{813840A2-6C65-8C47-9EA8-55A3FD83A1AA}" type="datetimeFigureOut">
               <a:rPr lang="en-US" smtClean="0"/>
-              <a:t>4/28/15</a:t>
+              <a:t>4/29/15</a:t>
             </a:fld>
             <a:endParaRPr lang="en-US"/>
           </a:p>
@@ -1054,7 +1054,7 @@
           <a:p>
             <a:fld id="{813840A2-6C65-8C47-9EA8-55A3FD83A1AA}" type="datetimeFigureOut">
               <a:rPr lang="en-US" smtClean="0"/>
-              <a:t>4/28/15</a:t>
+              <a:t>4/29/15</a:t>
             </a:fld>
             <a:endParaRPr lang="en-US"/>
           </a:p>
@@ -1342,7 +1342,7 @@
           <a:p>
             <a:fld id="{813840A2-6C65-8C47-9EA8-55A3FD83A1AA}" type="datetimeFigureOut">
               <a:rPr lang="en-US" smtClean="0"/>
-              <a:t>4/28/15</a:t>
+              <a:t>4/29/15</a:t>
             </a:fld>
             <a:endParaRPr lang="en-US"/>
           </a:p>
@@ -1769,7 +1769,7 @@
           <a:p>
             <a:fld id="{813840A2-6C65-8C47-9EA8-55A3FD83A1AA}" type="datetimeFigureOut">
               <a:rPr lang="en-US" smtClean="0"/>
-              <a:t>4/28/15</a:t>
+              <a:t>4/29/15</a:t>
             </a:fld>
             <a:endParaRPr lang="en-US"/>
           </a:p>
@@ -1887,7 +1887,7 @@
           <a:p>
             <a:fld id="{813840A2-6C65-8C47-9EA8-55A3FD83A1AA}" type="datetimeFigureOut">
               <a:rPr lang="en-US" smtClean="0"/>
-              <a:t>4/28/15</a:t>
+              <a:t>4/29/15</a:t>
             </a:fld>
             <a:endParaRPr lang="en-US"/>
           </a:p>
@@ -1982,7 +1982,7 @@
           <a:p>
             <a:fld id="{813840A2-6C65-8C47-9EA8-55A3FD83A1AA}" type="datetimeFigureOut">
               <a:rPr lang="en-US" smtClean="0"/>
-              <a:t>4/28/15</a:t>
+              <a:t>4/29/15</a:t>
             </a:fld>
             <a:endParaRPr lang="en-US"/>
           </a:p>
@@ -2259,7 +2259,7 @@
           <a:p>
             <a:fld id="{813840A2-6C65-8C47-9EA8-55A3FD83A1AA}" type="datetimeFigureOut">
               <a:rPr lang="en-US" smtClean="0"/>
-              <a:t>4/28/15</a:t>
+              <a:t>4/29/15</a:t>
             </a:fld>
             <a:endParaRPr lang="en-US"/>
           </a:p>
@@ -2512,7 +2512,7 @@
           <a:p>
             <a:fld id="{813840A2-6C65-8C47-9EA8-55A3FD83A1AA}" type="datetimeFigureOut">
               <a:rPr lang="en-US" smtClean="0"/>
-              <a:t>4/28/15</a:t>
+              <a:t>4/29/15</a:t>
             </a:fld>
             <a:endParaRPr lang="en-US"/>
           </a:p>
@@ -2725,7 +2725,7 @@
           <a:p>
             <a:fld id="{813840A2-6C65-8C47-9EA8-55A3FD83A1AA}" type="datetimeFigureOut">
               <a:rPr lang="en-US" smtClean="0"/>
-              <a:t>4/28/15</a:t>
+              <a:t>4/29/15</a:t>
             </a:fld>
             <a:endParaRPr lang="en-US"/>
           </a:p>
@@ -3202,15 +3202,7 @@
                   <a:schemeClr val="bg1"/>
                 </a:solidFill>
               </a:rPr>
-              <a:t>Start Counter </a:t>
-            </a:r>
-            <a:r>
-              <a:rPr lang="en-US" sz="3000" b="1" dirty="0" smtClean="0">
-                <a:solidFill>
-                  <a:schemeClr val="bg1"/>
-                </a:solidFill>
-              </a:rPr>
-              <a:t>240 MCP-PMT</a:t>
+              <a:t>Start Counter 240 MCP-PMT</a:t>
             </a:r>
             <a:endParaRPr lang="en-US" sz="3000" b="1" dirty="0">
               <a:solidFill>
@@ -3289,21 +3281,57 @@
                   <a:schemeClr val="bg1"/>
                 </a:solidFill>
               </a:rPr>
-              <a:t>Stop Counter </a:t>
-            </a:r>
-            <a:r>
-              <a:rPr lang="en-US" sz="3000" b="1" dirty="0" smtClean="0">
-                <a:solidFill>
-                  <a:schemeClr val="bg1"/>
-                </a:solidFill>
-              </a:rPr>
-              <a:t>240 MCP-PMT</a:t>
+              <a:t>Stop Counter 240 MCP-PMT</a:t>
             </a:r>
             <a:endParaRPr lang="en-US" sz="3000" b="1" dirty="0">
               <a:solidFill>
                 <a:schemeClr val="bg1"/>
               </a:solidFill>
             </a:endParaRPr>
+          </a:p>
+        </p:txBody>
+      </p:sp>
+      <p:sp>
+        <p:nvSpPr>
+          <p:cNvPr id="7" name="Up Arrow 6"/>
+          <p:cNvSpPr/>
+          <p:nvPr/>
+        </p:nvSpPr>
+        <p:spPr>
+          <a:xfrm>
+            <a:off x="5137464" y="4759412"/>
+            <a:ext cx="443464" cy="909551"/>
+          </a:xfrm>
+          <a:prstGeom prst="upArrow">
+            <a:avLst>
+              <a:gd name="adj1" fmla="val 48486"/>
+              <a:gd name="adj2" fmla="val 50000"/>
+            </a:avLst>
+          </a:prstGeom>
+          <a:solidFill>
+            <a:srgbClr val="FF0000"/>
+          </a:solidFill>
+        </p:spPr>
+        <p:style>
+          <a:lnRef idx="1">
+            <a:schemeClr val="accent1"/>
+          </a:lnRef>
+          <a:fillRef idx="3">
+            <a:schemeClr val="accent1"/>
+          </a:fillRef>
+          <a:effectRef idx="2">
+            <a:schemeClr val="accent1"/>
+          </a:effectRef>
+          <a:fontRef idx="minor">
+            <a:schemeClr val="lt1"/>
+          </a:fontRef>
+        </p:style>
+        <p:txBody>
+          <a:bodyPr rtlCol="0" anchor="ctr"/>
+          <a:lstStyle/>
+          <a:p>
+            <a:pPr algn="ctr"/>
+            <a:endParaRPr lang="en-US"/>
           </a:p>
         </p:txBody>
       </p:sp>

</xml_diff>